<commit_message>
[#310] Apply SRP to various git commands (#408)
All the git commands are embedded in the CommandRunner class.

This violates the Single Responsibility Principle as CommandRunner
should only be responsible for the execution, and not the type of
commands.

As a step towards deprecating the use of CommandRunner, let's export
the commands to respective classes and remove the direct dependency on
CommandRunner.
</commit_message>
<xml_diff>
--- a/docs/diagrams/architecture.pptx
+++ b/docs/diagrams/architecture.pptx
@@ -156,10 +156,9 @@
           </a:lstStyle>
           <a:p>
             <a:r>
-              <a:rPr lang="en-US" smtClean="0"/>
+              <a:rPr lang="en-US"/>
               <a:t>Click to edit Master title style</a:t>
             </a:r>
-            <a:endParaRPr lang="en-US"/>
           </a:p>
         </p:txBody>
       </p:sp>
@@ -221,10 +220,9 @@
           </a:lstStyle>
           <a:p>
             <a:r>
-              <a:rPr lang="en-US" smtClean="0"/>
+              <a:rPr lang="en-US"/>
               <a:t>Click to edit Master subtitle style</a:t>
             </a:r>
-            <a:endParaRPr lang="en-US"/>
           </a:p>
         </p:txBody>
       </p:sp>
@@ -245,7 +243,7 @@
           <a:p>
             <a:fld id="{F4C5997A-E221-43A6-9AE7-DBA0CB9777B0}" type="datetimeFigureOut">
               <a:rPr lang="en-US" smtClean="0"/>
-              <a:t>7/2/2018</a:t>
+              <a:t>12/20/2018</a:t>
             </a:fld>
             <a:endParaRPr lang="en-US"/>
           </a:p>
@@ -339,10 +337,9 @@
           <a:lstStyle/>
           <a:p>
             <a:r>
-              <a:rPr lang="en-US" smtClean="0"/>
+              <a:rPr lang="en-US"/>
               <a:t>Click to edit Master title style</a:t>
             </a:r>
-            <a:endParaRPr lang="en-US"/>
           </a:p>
         </p:txBody>
       </p:sp>
@@ -363,38 +360,37 @@
           <a:p>
             <a:pPr lvl="0"/>
             <a:r>
-              <a:rPr lang="en-US" smtClean="0"/>
+              <a:rPr lang="en-US"/>
               <a:t>Click to edit Master text styles</a:t>
             </a:r>
           </a:p>
           <a:p>
             <a:pPr lvl="1"/>
             <a:r>
-              <a:rPr lang="en-US" smtClean="0"/>
+              <a:rPr lang="en-US"/>
               <a:t>Second level</a:t>
             </a:r>
           </a:p>
           <a:p>
             <a:pPr lvl="2"/>
             <a:r>
-              <a:rPr lang="en-US" smtClean="0"/>
+              <a:rPr lang="en-US"/>
               <a:t>Third level</a:t>
             </a:r>
           </a:p>
           <a:p>
             <a:pPr lvl="3"/>
             <a:r>
-              <a:rPr lang="en-US" smtClean="0"/>
+              <a:rPr lang="en-US"/>
               <a:t>Fourth level</a:t>
             </a:r>
           </a:p>
           <a:p>
             <a:pPr lvl="4"/>
             <a:r>
-              <a:rPr lang="en-US" smtClean="0"/>
+              <a:rPr lang="en-US"/>
               <a:t>Fifth level</a:t>
             </a:r>
-            <a:endParaRPr lang="en-US"/>
           </a:p>
         </p:txBody>
       </p:sp>
@@ -415,7 +411,7 @@
           <a:p>
             <a:fld id="{F4C5997A-E221-43A6-9AE7-DBA0CB9777B0}" type="datetimeFigureOut">
               <a:rPr lang="en-US" smtClean="0"/>
-              <a:t>7/2/2018</a:t>
+              <a:t>12/20/2018</a:t>
             </a:fld>
             <a:endParaRPr lang="en-US"/>
           </a:p>
@@ -514,10 +510,9 @@
           <a:lstStyle/>
           <a:p>
             <a:r>
-              <a:rPr lang="en-US" smtClean="0"/>
+              <a:rPr lang="en-US"/>
               <a:t>Click to edit Master title style</a:t>
             </a:r>
-            <a:endParaRPr lang="en-US"/>
           </a:p>
         </p:txBody>
       </p:sp>
@@ -543,38 +538,37 @@
           <a:p>
             <a:pPr lvl="0"/>
             <a:r>
-              <a:rPr lang="en-US" smtClean="0"/>
+              <a:rPr lang="en-US"/>
               <a:t>Click to edit Master text styles</a:t>
             </a:r>
           </a:p>
           <a:p>
             <a:pPr lvl="1"/>
             <a:r>
-              <a:rPr lang="en-US" smtClean="0"/>
+              <a:rPr lang="en-US"/>
               <a:t>Second level</a:t>
             </a:r>
           </a:p>
           <a:p>
             <a:pPr lvl="2"/>
             <a:r>
-              <a:rPr lang="en-US" smtClean="0"/>
+              <a:rPr lang="en-US"/>
               <a:t>Third level</a:t>
             </a:r>
           </a:p>
           <a:p>
             <a:pPr lvl="3"/>
             <a:r>
-              <a:rPr lang="en-US" smtClean="0"/>
+              <a:rPr lang="en-US"/>
               <a:t>Fourth level</a:t>
             </a:r>
           </a:p>
           <a:p>
             <a:pPr lvl="4"/>
             <a:r>
-              <a:rPr lang="en-US" smtClean="0"/>
+              <a:rPr lang="en-US"/>
               <a:t>Fifth level</a:t>
             </a:r>
-            <a:endParaRPr lang="en-US"/>
           </a:p>
         </p:txBody>
       </p:sp>
@@ -595,7 +589,7 @@
           <a:p>
             <a:fld id="{F4C5997A-E221-43A6-9AE7-DBA0CB9777B0}" type="datetimeFigureOut">
               <a:rPr lang="en-US" smtClean="0"/>
-              <a:t>7/2/2018</a:t>
+              <a:t>12/20/2018</a:t>
             </a:fld>
             <a:endParaRPr lang="en-US"/>
           </a:p>
@@ -689,10 +683,9 @@
           <a:lstStyle/>
           <a:p>
             <a:r>
-              <a:rPr lang="en-US" smtClean="0"/>
+              <a:rPr lang="en-US"/>
               <a:t>Click to edit Master title style</a:t>
             </a:r>
-            <a:endParaRPr lang="en-US"/>
           </a:p>
         </p:txBody>
       </p:sp>
@@ -713,38 +706,37 @@
           <a:p>
             <a:pPr lvl="0"/>
             <a:r>
-              <a:rPr lang="en-US" smtClean="0"/>
+              <a:rPr lang="en-US"/>
               <a:t>Click to edit Master text styles</a:t>
             </a:r>
           </a:p>
           <a:p>
             <a:pPr lvl="1"/>
             <a:r>
-              <a:rPr lang="en-US" smtClean="0"/>
+              <a:rPr lang="en-US"/>
               <a:t>Second level</a:t>
             </a:r>
           </a:p>
           <a:p>
             <a:pPr lvl="2"/>
             <a:r>
-              <a:rPr lang="en-US" smtClean="0"/>
+              <a:rPr lang="en-US"/>
               <a:t>Third level</a:t>
             </a:r>
           </a:p>
           <a:p>
             <a:pPr lvl="3"/>
             <a:r>
-              <a:rPr lang="en-US" smtClean="0"/>
+              <a:rPr lang="en-US"/>
               <a:t>Fourth level</a:t>
             </a:r>
           </a:p>
           <a:p>
             <a:pPr lvl="4"/>
             <a:r>
-              <a:rPr lang="en-US" smtClean="0"/>
+              <a:rPr lang="en-US"/>
               <a:t>Fifth level</a:t>
             </a:r>
-            <a:endParaRPr lang="en-US"/>
           </a:p>
         </p:txBody>
       </p:sp>
@@ -765,7 +757,7 @@
           <a:p>
             <a:fld id="{F4C5997A-E221-43A6-9AE7-DBA0CB9777B0}" type="datetimeFigureOut">
               <a:rPr lang="en-US" smtClean="0"/>
-              <a:t>7/2/2018</a:t>
+              <a:t>12/20/2018</a:t>
             </a:fld>
             <a:endParaRPr lang="en-US"/>
           </a:p>
@@ -868,10 +860,9 @@
           </a:lstStyle>
           <a:p>
             <a:r>
-              <a:rPr lang="en-US" smtClean="0"/>
+              <a:rPr lang="en-US"/>
               <a:t>Click to edit Master title style</a:t>
             </a:r>
-            <a:endParaRPr lang="en-US"/>
           </a:p>
         </p:txBody>
       </p:sp>
@@ -988,7 +979,7 @@
           <a:p>
             <a:pPr lvl="0"/>
             <a:r>
-              <a:rPr lang="en-US" smtClean="0"/>
+              <a:rPr lang="en-US"/>
               <a:t>Click to edit Master text styles</a:t>
             </a:r>
           </a:p>
@@ -1011,7 +1002,7 @@
           <a:p>
             <a:fld id="{F4C5997A-E221-43A6-9AE7-DBA0CB9777B0}" type="datetimeFigureOut">
               <a:rPr lang="en-US" smtClean="0"/>
-              <a:t>7/2/2018</a:t>
+              <a:t>12/20/2018</a:t>
             </a:fld>
             <a:endParaRPr lang="en-US"/>
           </a:p>
@@ -1105,10 +1096,9 @@
           <a:lstStyle/>
           <a:p>
             <a:r>
-              <a:rPr lang="en-US" smtClean="0"/>
+              <a:rPr lang="en-US"/>
               <a:t>Click to edit Master title style</a:t>
             </a:r>
-            <a:endParaRPr lang="en-US"/>
           </a:p>
         </p:txBody>
       </p:sp>
@@ -1134,38 +1124,37 @@
           <a:p>
             <a:pPr lvl="0"/>
             <a:r>
-              <a:rPr lang="en-US" smtClean="0"/>
+              <a:rPr lang="en-US"/>
               <a:t>Click to edit Master text styles</a:t>
             </a:r>
           </a:p>
           <a:p>
             <a:pPr lvl="1"/>
             <a:r>
-              <a:rPr lang="en-US" smtClean="0"/>
+              <a:rPr lang="en-US"/>
               <a:t>Second level</a:t>
             </a:r>
           </a:p>
           <a:p>
             <a:pPr lvl="2"/>
             <a:r>
-              <a:rPr lang="en-US" smtClean="0"/>
+              <a:rPr lang="en-US"/>
               <a:t>Third level</a:t>
             </a:r>
           </a:p>
           <a:p>
             <a:pPr lvl="3"/>
             <a:r>
-              <a:rPr lang="en-US" smtClean="0"/>
+              <a:rPr lang="en-US"/>
               <a:t>Fourth level</a:t>
             </a:r>
           </a:p>
           <a:p>
             <a:pPr lvl="4"/>
             <a:r>
-              <a:rPr lang="en-US" smtClean="0"/>
+              <a:rPr lang="en-US"/>
               <a:t>Fifth level</a:t>
             </a:r>
-            <a:endParaRPr lang="en-US"/>
           </a:p>
         </p:txBody>
       </p:sp>
@@ -1191,38 +1180,37 @@
           <a:p>
             <a:pPr lvl="0"/>
             <a:r>
-              <a:rPr lang="en-US" smtClean="0"/>
+              <a:rPr lang="en-US"/>
               <a:t>Click to edit Master text styles</a:t>
             </a:r>
           </a:p>
           <a:p>
             <a:pPr lvl="1"/>
             <a:r>
-              <a:rPr lang="en-US" smtClean="0"/>
+              <a:rPr lang="en-US"/>
               <a:t>Second level</a:t>
             </a:r>
           </a:p>
           <a:p>
             <a:pPr lvl="2"/>
             <a:r>
-              <a:rPr lang="en-US" smtClean="0"/>
+              <a:rPr lang="en-US"/>
               <a:t>Third level</a:t>
             </a:r>
           </a:p>
           <a:p>
             <a:pPr lvl="3"/>
             <a:r>
-              <a:rPr lang="en-US" smtClean="0"/>
+              <a:rPr lang="en-US"/>
               <a:t>Fourth level</a:t>
             </a:r>
           </a:p>
           <a:p>
             <a:pPr lvl="4"/>
             <a:r>
-              <a:rPr lang="en-US" smtClean="0"/>
+              <a:rPr lang="en-US"/>
               <a:t>Fifth level</a:t>
             </a:r>
-            <a:endParaRPr lang="en-US"/>
           </a:p>
         </p:txBody>
       </p:sp>
@@ -1243,7 +1231,7 @@
           <a:p>
             <a:fld id="{F4C5997A-E221-43A6-9AE7-DBA0CB9777B0}" type="datetimeFigureOut">
               <a:rPr lang="en-US" smtClean="0"/>
-              <a:t>7/2/2018</a:t>
+              <a:t>12/20/2018</a:t>
             </a:fld>
             <a:endParaRPr lang="en-US"/>
           </a:p>
@@ -1342,10 +1330,9 @@
           <a:lstStyle/>
           <a:p>
             <a:r>
-              <a:rPr lang="en-US" smtClean="0"/>
+              <a:rPr lang="en-US"/>
               <a:t>Click to edit Master title style</a:t>
             </a:r>
-            <a:endParaRPr lang="en-US"/>
           </a:p>
         </p:txBody>
       </p:sp>
@@ -1408,7 +1395,7 @@
           <a:p>
             <a:pPr lvl="0"/>
             <a:r>
-              <a:rPr lang="en-US" smtClean="0"/>
+              <a:rPr lang="en-US"/>
               <a:t>Click to edit Master text styles</a:t>
             </a:r>
           </a:p>
@@ -1436,38 +1423,37 @@
           <a:p>
             <a:pPr lvl="0"/>
             <a:r>
-              <a:rPr lang="en-US" smtClean="0"/>
+              <a:rPr lang="en-US"/>
               <a:t>Click to edit Master text styles</a:t>
             </a:r>
           </a:p>
           <a:p>
             <a:pPr lvl="1"/>
             <a:r>
-              <a:rPr lang="en-US" smtClean="0"/>
+              <a:rPr lang="en-US"/>
               <a:t>Second level</a:t>
             </a:r>
           </a:p>
           <a:p>
             <a:pPr lvl="2"/>
             <a:r>
-              <a:rPr lang="en-US" smtClean="0"/>
+              <a:rPr lang="en-US"/>
               <a:t>Third level</a:t>
             </a:r>
           </a:p>
           <a:p>
             <a:pPr lvl="3"/>
             <a:r>
-              <a:rPr lang="en-US" smtClean="0"/>
+              <a:rPr lang="en-US"/>
               <a:t>Fourth level</a:t>
             </a:r>
           </a:p>
           <a:p>
             <a:pPr lvl="4"/>
             <a:r>
-              <a:rPr lang="en-US" smtClean="0"/>
+              <a:rPr lang="en-US"/>
               <a:t>Fifth level</a:t>
             </a:r>
-            <a:endParaRPr lang="en-US"/>
           </a:p>
         </p:txBody>
       </p:sp>
@@ -1530,7 +1516,7 @@
           <a:p>
             <a:pPr lvl="0"/>
             <a:r>
-              <a:rPr lang="en-US" smtClean="0"/>
+              <a:rPr lang="en-US"/>
               <a:t>Click to edit Master text styles</a:t>
             </a:r>
           </a:p>
@@ -1558,38 +1544,37 @@
           <a:p>
             <a:pPr lvl="0"/>
             <a:r>
-              <a:rPr lang="en-US" smtClean="0"/>
+              <a:rPr lang="en-US"/>
               <a:t>Click to edit Master text styles</a:t>
             </a:r>
           </a:p>
           <a:p>
             <a:pPr lvl="1"/>
             <a:r>
-              <a:rPr lang="en-US" smtClean="0"/>
+              <a:rPr lang="en-US"/>
               <a:t>Second level</a:t>
             </a:r>
           </a:p>
           <a:p>
             <a:pPr lvl="2"/>
             <a:r>
-              <a:rPr lang="en-US" smtClean="0"/>
+              <a:rPr lang="en-US"/>
               <a:t>Third level</a:t>
             </a:r>
           </a:p>
           <a:p>
             <a:pPr lvl="3"/>
             <a:r>
-              <a:rPr lang="en-US" smtClean="0"/>
+              <a:rPr lang="en-US"/>
               <a:t>Fourth level</a:t>
             </a:r>
           </a:p>
           <a:p>
             <a:pPr lvl="4"/>
             <a:r>
-              <a:rPr lang="en-US" smtClean="0"/>
+              <a:rPr lang="en-US"/>
               <a:t>Fifth level</a:t>
             </a:r>
-            <a:endParaRPr lang="en-US"/>
           </a:p>
         </p:txBody>
       </p:sp>
@@ -1610,7 +1595,7 @@
           <a:p>
             <a:fld id="{F4C5997A-E221-43A6-9AE7-DBA0CB9777B0}" type="datetimeFigureOut">
               <a:rPr lang="en-US" smtClean="0"/>
-              <a:t>7/2/2018</a:t>
+              <a:t>12/20/2018</a:t>
             </a:fld>
             <a:endParaRPr lang="en-US"/>
           </a:p>
@@ -1704,10 +1689,9 @@
           <a:lstStyle/>
           <a:p>
             <a:r>
-              <a:rPr lang="en-US" smtClean="0"/>
+              <a:rPr lang="en-US"/>
               <a:t>Click to edit Master title style</a:t>
             </a:r>
-            <a:endParaRPr lang="en-US"/>
           </a:p>
         </p:txBody>
       </p:sp>
@@ -1728,7 +1712,7 @@
           <a:p>
             <a:fld id="{F4C5997A-E221-43A6-9AE7-DBA0CB9777B0}" type="datetimeFigureOut">
               <a:rPr lang="en-US" smtClean="0"/>
-              <a:t>7/2/2018</a:t>
+              <a:t>12/20/2018</a:t>
             </a:fld>
             <a:endParaRPr lang="en-US"/>
           </a:p>
@@ -1823,7 +1807,7 @@
           <a:p>
             <a:fld id="{F4C5997A-E221-43A6-9AE7-DBA0CB9777B0}" type="datetimeFigureOut">
               <a:rPr lang="en-US" smtClean="0"/>
-              <a:t>7/2/2018</a:t>
+              <a:t>12/20/2018</a:t>
             </a:fld>
             <a:endParaRPr lang="en-US"/>
           </a:p>
@@ -1926,10 +1910,9 @@
           </a:lstStyle>
           <a:p>
             <a:r>
-              <a:rPr lang="en-US" smtClean="0"/>
+              <a:rPr lang="en-US"/>
               <a:t>Click to edit Master title style</a:t>
             </a:r>
-            <a:endParaRPr lang="en-US"/>
           </a:p>
         </p:txBody>
       </p:sp>
@@ -1983,38 +1966,37 @@
           <a:p>
             <a:pPr lvl="0"/>
             <a:r>
-              <a:rPr lang="en-US" smtClean="0"/>
+              <a:rPr lang="en-US"/>
               <a:t>Click to edit Master text styles</a:t>
             </a:r>
           </a:p>
           <a:p>
             <a:pPr lvl="1"/>
             <a:r>
-              <a:rPr lang="en-US" smtClean="0"/>
+              <a:rPr lang="en-US"/>
               <a:t>Second level</a:t>
             </a:r>
           </a:p>
           <a:p>
             <a:pPr lvl="2"/>
             <a:r>
-              <a:rPr lang="en-US" smtClean="0"/>
+              <a:rPr lang="en-US"/>
               <a:t>Third level</a:t>
             </a:r>
           </a:p>
           <a:p>
             <a:pPr lvl="3"/>
             <a:r>
-              <a:rPr lang="en-US" smtClean="0"/>
+              <a:rPr lang="en-US"/>
               <a:t>Fourth level</a:t>
             </a:r>
           </a:p>
           <a:p>
             <a:pPr lvl="4"/>
             <a:r>
-              <a:rPr lang="en-US" smtClean="0"/>
+              <a:rPr lang="en-US"/>
               <a:t>Fifth level</a:t>
             </a:r>
-            <a:endParaRPr lang="en-US"/>
           </a:p>
         </p:txBody>
       </p:sp>
@@ -2077,7 +2059,7 @@
           <a:p>
             <a:pPr lvl="0"/>
             <a:r>
-              <a:rPr lang="en-US" smtClean="0"/>
+              <a:rPr lang="en-US"/>
               <a:t>Click to edit Master text styles</a:t>
             </a:r>
           </a:p>
@@ -2100,7 +2082,7 @@
           <a:p>
             <a:fld id="{F4C5997A-E221-43A6-9AE7-DBA0CB9777B0}" type="datetimeFigureOut">
               <a:rPr lang="en-US" smtClean="0"/>
-              <a:t>7/2/2018</a:t>
+              <a:t>12/20/2018</a:t>
             </a:fld>
             <a:endParaRPr lang="en-US"/>
           </a:p>
@@ -2203,10 +2185,9 @@
           </a:lstStyle>
           <a:p>
             <a:r>
-              <a:rPr lang="en-US" smtClean="0"/>
+              <a:rPr lang="en-US"/>
               <a:t>Click to edit Master title style</a:t>
             </a:r>
-            <a:endParaRPr lang="en-US"/>
           </a:p>
         </p:txBody>
       </p:sp>
@@ -2330,7 +2311,7 @@
           <a:p>
             <a:pPr lvl="0"/>
             <a:r>
-              <a:rPr lang="en-US" smtClean="0"/>
+              <a:rPr lang="en-US"/>
               <a:t>Click to edit Master text styles</a:t>
             </a:r>
           </a:p>
@@ -2353,7 +2334,7 @@
           <a:p>
             <a:fld id="{F4C5997A-E221-43A6-9AE7-DBA0CB9777B0}" type="datetimeFigureOut">
               <a:rPr lang="en-US" smtClean="0"/>
-              <a:t>7/2/2018</a:t>
+              <a:t>12/20/2018</a:t>
             </a:fld>
             <a:endParaRPr lang="en-US"/>
           </a:p>
@@ -2462,10 +2443,9 @@
           <a:lstStyle/>
           <a:p>
             <a:r>
-              <a:rPr lang="en-US" smtClean="0"/>
+              <a:rPr lang="en-US"/>
               <a:t>Click to edit Master title style</a:t>
             </a:r>
-            <a:endParaRPr lang="en-US"/>
           </a:p>
         </p:txBody>
       </p:sp>
@@ -2496,38 +2476,37 @@
           <a:p>
             <a:pPr lvl="0"/>
             <a:r>
-              <a:rPr lang="en-US" smtClean="0"/>
+              <a:rPr lang="en-US"/>
               <a:t>Click to edit Master text styles</a:t>
             </a:r>
           </a:p>
           <a:p>
             <a:pPr lvl="1"/>
             <a:r>
-              <a:rPr lang="en-US" smtClean="0"/>
+              <a:rPr lang="en-US"/>
               <a:t>Second level</a:t>
             </a:r>
           </a:p>
           <a:p>
             <a:pPr lvl="2"/>
             <a:r>
-              <a:rPr lang="en-US" smtClean="0"/>
+              <a:rPr lang="en-US"/>
               <a:t>Third level</a:t>
             </a:r>
           </a:p>
           <a:p>
             <a:pPr lvl="3"/>
             <a:r>
-              <a:rPr lang="en-US" smtClean="0"/>
+              <a:rPr lang="en-US"/>
               <a:t>Fourth level</a:t>
             </a:r>
           </a:p>
           <a:p>
             <a:pPr lvl="4"/>
             <a:r>
-              <a:rPr lang="en-US" smtClean="0"/>
+              <a:rPr lang="en-US"/>
               <a:t>Fifth level</a:t>
             </a:r>
-            <a:endParaRPr lang="en-US"/>
           </a:p>
         </p:txBody>
       </p:sp>
@@ -2566,7 +2545,7 @@
           <a:p>
             <a:fld id="{F4C5997A-E221-43A6-9AE7-DBA0CB9777B0}" type="datetimeFigureOut">
               <a:rPr lang="en-US" smtClean="0"/>
-              <a:t>7/2/2018</a:t>
+              <a:t>12/20/2018</a:t>
             </a:fld>
             <a:endParaRPr lang="en-US"/>
           </a:p>
@@ -2987,7 +2966,7 @@
           <a:lstStyle/>
           <a:p>
             <a:r>
-              <a:rPr lang="en-US" dirty="0" err="1" smtClean="0"/>
+              <a:rPr lang="en-US" dirty="0" err="1"/>
               <a:t>RepoSense</a:t>
             </a:r>
             <a:endParaRPr lang="en-US" dirty="0"/>
@@ -3023,13 +3002,6 @@
   <p:clrMapOvr>
     <a:masterClrMapping/>
   </p:clrMapOvr>
-  <p:timing>
-    <p:tnLst>
-      <p:par>
-        <p:cTn id="1" dur="indefinite" restart="never" nodeType="tmRoot"/>
-      </p:par>
-    </p:tnLst>
-  </p:timing>
 </p:sld>
 </file>
 
@@ -3066,10 +3038,9 @@
           <a:lstStyle/>
           <a:p>
             <a:r>
-              <a:rPr lang="en-US" dirty="0" smtClean="0"/>
+              <a:rPr lang="en-US" dirty="0"/>
               <a:t>Architecture Goals</a:t>
             </a:r>
-            <a:endParaRPr lang="en-US" dirty="0"/>
           </a:p>
         </p:txBody>
       </p:sp>
@@ -3086,7 +3057,7 @@
         <p:spPr/>
         <p:txBody>
           <a:bodyPr>
-            <a:normAutofit fontScale="92500"/>
+            <a:normAutofit lnSpcReduction="10000"/>
           </a:bodyPr>
           <a:lstStyle/>
           <a:p>
@@ -3097,13 +3068,8 @@
             </a:pPr>
             <a:r>
               <a:rPr lang="en-US" dirty="0"/>
-              <a:t>Allow </a:t>
-            </a:r>
-            <a:r>
-              <a:rPr lang="en-US" dirty="0" smtClean="0"/>
-              <a:t>concurrency during processing</a:t>
-            </a:r>
-            <a:endParaRPr lang="en-US" dirty="0"/>
+              <a:t>Allow concurrency during processing</a:t>
+            </a:r>
           </a:p>
           <a:p>
             <a:pPr marL="457200" lvl="1" indent="0">
@@ -3114,17 +3080,9 @@
             </a:pPr>
             <a:r>
               <a:rPr lang="en-US" dirty="0"/>
-              <a:t>→ </a:t>
-            </a:r>
-            <a:r>
-              <a:rPr lang="en-US" dirty="0" smtClean="0"/>
-              <a:t>per-unit (e.g., per-person/file/repo/commit …),  </a:t>
-            </a:r>
-            <a:r>
-              <a:rPr lang="en-US" dirty="0"/>
-              <a:t>processing as much as possible</a:t>
-            </a:r>
-            <a:endParaRPr lang="en-US" b="0" dirty="0" smtClean="0">
+              <a:t>→ per-unit (e.g., per-person/file/repo/commit …),  processing as much as possible</a:t>
+            </a:r>
+            <a:endParaRPr lang="en-US" b="0" dirty="0">
               <a:effectLst/>
             </a:endParaRPr>
           </a:p>
@@ -3148,15 +3106,7 @@
             </a:pPr>
             <a:r>
               <a:rPr lang="en-US" dirty="0"/>
-              <a:t>→ </a:t>
-            </a:r>
-            <a:r>
-              <a:rPr lang="en-US" dirty="0" smtClean="0"/>
-              <a:t>per-unit </a:t>
-            </a:r>
-            <a:r>
-              <a:rPr lang="en-US" dirty="0"/>
-              <a:t>processing as much as possible</a:t>
+              <a:t>→ per-unit processing as much as possible</a:t>
             </a:r>
           </a:p>
           <a:p>
@@ -3179,21 +3129,8 @@
             </a:pPr>
             <a:r>
               <a:rPr lang="en-US" dirty="0"/>
-              <a:t>→ </a:t>
-            </a:r>
-            <a:r>
-              <a:rPr lang="en-US" dirty="0" smtClean="0"/>
-              <a:t>Loosely-coupled </a:t>
-            </a:r>
-            <a:r>
-              <a:rPr lang="en-US" dirty="0"/>
-              <a:t>pipes/filters-type </a:t>
-            </a:r>
-            <a:r>
-              <a:rPr lang="en-US" dirty="0" smtClean="0"/>
-              <a:t>components</a:t>
-            </a:r>
-            <a:endParaRPr lang="en-US" dirty="0"/>
+              <a:t>→ Loosely-coupled pipes/filters-type components</a:t>
+            </a:r>
           </a:p>
         </p:txBody>
       </p:sp>
@@ -3610,7 +3547,7 @@
           <a:p>
             <a:pPr algn="ctr"/>
             <a:r>
-              <a:rPr lang="en-US" sz="1200" dirty="0" err="1" smtClean="0"/>
+              <a:rPr lang="en-US" sz="1200" dirty="0" err="1"/>
               <a:t>ConfigParser</a:t>
             </a:r>
             <a:endParaRPr lang="en-US" sz="1200" dirty="0"/>
@@ -3662,21 +3599,16 @@
           <a:p>
             <a:pPr algn="ctr"/>
             <a:r>
-              <a:rPr lang="en-US" sz="1200" dirty="0" err="1" smtClean="0"/>
+              <a:rPr lang="en-US" sz="1200" dirty="0"/>
               <a:t>Git</a:t>
             </a:r>
-            <a:r>
-              <a:rPr lang="en-US" sz="1200" dirty="0" smtClean="0"/>
-              <a:t/>
-            </a:r>
             <a:br>
-              <a:rPr lang="en-US" sz="1200" dirty="0" smtClean="0"/>
+              <a:rPr lang="en-US" sz="1200" dirty="0"/>
             </a:br>
             <a:r>
-              <a:rPr lang="en-US" sz="1200" dirty="0" smtClean="0"/>
-              <a:t>Downloader</a:t>
-            </a:r>
-            <a:endParaRPr lang="en-US" sz="1200" dirty="0"/>
+              <a:rPr lang="en-US" sz="1200" dirty="0"/>
+              <a:t>Clone</a:t>
+            </a:r>
           </a:p>
         </p:txBody>
       </p:sp>
@@ -3725,21 +3657,16 @@
           <a:p>
             <a:pPr algn="ctr"/>
             <a:r>
-              <a:rPr lang="en-US" sz="1200" dirty="0" err="1" smtClean="0"/>
+              <a:rPr lang="en-US" sz="1200" dirty="0" err="1"/>
               <a:t>CommitInfo</a:t>
             </a:r>
-            <a:r>
-              <a:rPr lang="en-US" sz="1200" dirty="0" smtClean="0"/>
-              <a:t/>
-            </a:r>
             <a:br>
-              <a:rPr lang="en-US" sz="1200" dirty="0" smtClean="0"/>
+              <a:rPr lang="en-US" sz="1200" dirty="0"/>
             </a:br>
             <a:r>
-              <a:rPr lang="en-US" sz="1200" dirty="0" smtClean="0"/>
+              <a:rPr lang="en-US" sz="1200" dirty="0"/>
               <a:t>Extractor</a:t>
             </a:r>
-            <a:endParaRPr lang="en-US" sz="1200" dirty="0"/>
           </a:p>
         </p:txBody>
       </p:sp>
@@ -3788,21 +3715,16 @@
           <a:p>
             <a:pPr algn="ctr"/>
             <a:r>
-              <a:rPr lang="en-US" sz="1200" dirty="0" err="1" smtClean="0"/>
+              <a:rPr lang="en-US" sz="1200" dirty="0" err="1"/>
               <a:t>CommitInfo</a:t>
             </a:r>
-            <a:r>
-              <a:rPr lang="en-US" sz="1200" dirty="0" smtClean="0"/>
-              <a:t/>
-            </a:r>
             <a:br>
-              <a:rPr lang="en-US" sz="1200" dirty="0" smtClean="0"/>
+              <a:rPr lang="en-US" sz="1200" dirty="0"/>
             </a:br>
             <a:r>
-              <a:rPr lang="en-US" sz="1200" dirty="0" smtClean="0"/>
+              <a:rPr lang="en-US" sz="1200" dirty="0"/>
               <a:t>Analyzer</a:t>
             </a:r>
-            <a:endParaRPr lang="en-US" sz="1200" dirty="0"/>
           </a:p>
         </p:txBody>
       </p:sp>
@@ -3851,21 +3773,16 @@
           <a:p>
             <a:pPr algn="ctr"/>
             <a:r>
-              <a:rPr lang="en-US" sz="1200" dirty="0" err="1" smtClean="0"/>
+              <a:rPr lang="en-US" sz="1200" dirty="0" err="1"/>
               <a:t>CommitResults</a:t>
             </a:r>
-            <a:r>
-              <a:rPr lang="en-US" sz="1200" dirty="0" smtClean="0"/>
-              <a:t/>
-            </a:r>
             <a:br>
-              <a:rPr lang="en-US" sz="1200" dirty="0" smtClean="0"/>
+              <a:rPr lang="en-US" sz="1200" dirty="0"/>
             </a:br>
             <a:r>
-              <a:rPr lang="en-US" sz="1200" dirty="0" smtClean="0"/>
+              <a:rPr lang="en-US" sz="1200" dirty="0"/>
               <a:t>Aggregator</a:t>
             </a:r>
-            <a:endParaRPr lang="en-US" sz="1200" dirty="0"/>
           </a:p>
         </p:txBody>
       </p:sp>
@@ -4021,17 +3938,16 @@
             <a:p>
               <a:pPr algn="ctr"/>
               <a:r>
-                <a:rPr lang="en-US" sz="1200" dirty="0" smtClean="0"/>
+                <a:rPr lang="en-US" sz="1200" dirty="0"/>
                 <a:t>Dashboard</a:t>
               </a:r>
               <a:br>
-                <a:rPr lang="en-US" sz="1200" dirty="0" smtClean="0"/>
+                <a:rPr lang="en-US" sz="1200" dirty="0"/>
               </a:br>
               <a:r>
-                <a:rPr lang="en-US" sz="1200" dirty="0" smtClean="0"/>
+                <a:rPr lang="en-US" sz="1200" dirty="0"/>
                 <a:t>(HTML, CSS, JS)</a:t>
               </a:r>
-              <a:endParaRPr lang="en-US" sz="1200" dirty="0"/>
             </a:p>
           </p:txBody>
         </p:sp>
@@ -4081,7 +3997,7 @@
           <a:p>
             <a:pPr algn="ctr"/>
             <a:r>
-              <a:rPr lang="en-US" sz="1200" dirty="0" err="1" smtClean="0"/>
+              <a:rPr lang="en-US" sz="1200" dirty="0" err="1"/>
               <a:t>ResultsAggregator</a:t>
             </a:r>
             <a:endParaRPr lang="en-US" sz="1200" dirty="0"/>
@@ -4243,14 +4159,13 @@
             <a:p>
               <a:pPr algn="ctr"/>
               <a:r>
-                <a:rPr lang="en-US" sz="1200" dirty="0" err="1" smtClean="0"/>
+                <a:rPr lang="en-US" sz="1200" dirty="0" err="1"/>
                 <a:t>Config</a:t>
               </a:r>
               <a:r>
-                <a:rPr lang="en-US" sz="1200" dirty="0" smtClean="0"/>
+                <a:rPr lang="en-US" sz="1200" dirty="0"/>
                 <a:t> files (csv, JSON)</a:t>
               </a:r>
-              <a:endParaRPr lang="en-US" sz="1200" dirty="0"/>
             </a:p>
           </p:txBody>
         </p:sp>
@@ -4279,7 +4194,7 @@
           <a:p>
             <a:pPr algn="r"/>
             <a:r>
-              <a:rPr lang="en-US" sz="1100" dirty="0" smtClean="0">
+              <a:rPr lang="en-US" sz="1100" dirty="0">
                 <a:solidFill>
                   <a:srgbClr val="7030A0"/>
                 </a:solidFill>
@@ -4288,7 +4203,7 @@
               <a:t>CLI </a:t>
             </a:r>
             <a:r>
-              <a:rPr lang="en-US" sz="1100" dirty="0" err="1" smtClean="0">
+              <a:rPr lang="en-US" sz="1100" dirty="0" err="1">
                 <a:solidFill>
                   <a:srgbClr val="7030A0"/>
                 </a:solidFill>
@@ -4424,7 +4339,7 @@
           <a:p>
             <a:pPr algn="ctr"/>
             <a:r>
-              <a:rPr lang="en-US" sz="1200" dirty="0" err="1" smtClean="0"/>
+              <a:rPr lang="en-US" sz="1200" dirty="0" err="1"/>
               <a:t>Config</a:t>
             </a:r>
             <a:endParaRPr lang="en-US" sz="1200" dirty="0"/>
@@ -4660,10 +4575,9 @@
             <a:p>
               <a:pPr algn="ctr"/>
               <a:r>
-                <a:rPr lang="en-US" sz="1200" dirty="0" smtClean="0"/>
+                <a:rPr lang="en-US" sz="1200" dirty="0"/>
                 <a:t>Repos</a:t>
               </a:r>
-              <a:endParaRPr lang="en-US" sz="1200" dirty="0"/>
             </a:p>
           </p:txBody>
         </p:sp>
@@ -4897,10 +4811,9 @@
             <a:p>
               <a:pPr algn="ctr"/>
               <a:r>
-                <a:rPr lang="en-US" sz="1200" dirty="0" smtClean="0"/>
+                <a:rPr lang="en-US" sz="1200" dirty="0"/>
                 <a:t>Commit Info</a:t>
               </a:r>
-              <a:endParaRPr lang="en-US" sz="1200" dirty="0"/>
             </a:p>
           </p:txBody>
         </p:sp>
@@ -5134,10 +5047,9 @@
             <a:p>
               <a:pPr algn="ctr"/>
               <a:r>
-                <a:rPr lang="en-US" sz="1200" dirty="0" smtClean="0"/>
+                <a:rPr lang="en-US" sz="1200" dirty="0"/>
                 <a:t>Commit results</a:t>
               </a:r>
-              <a:endParaRPr lang="en-US" sz="1200" dirty="0"/>
             </a:p>
           </p:txBody>
         </p:sp>
@@ -5371,10 +5283,9 @@
             <a:p>
               <a:pPr algn="ctr"/>
               <a:r>
-                <a:rPr lang="en-US" sz="1200" dirty="0" smtClean="0"/>
+                <a:rPr lang="en-US" sz="1200" dirty="0"/>
                 <a:t>Per-unit results </a:t>
               </a:r>
-              <a:endParaRPr lang="en-US" sz="1200" dirty="0"/>
             </a:p>
           </p:txBody>
         </p:sp>
@@ -5461,21 +5372,16 @@
           <a:p>
             <a:pPr algn="ctr"/>
             <a:r>
-              <a:rPr lang="en-US" sz="1200" dirty="0" err="1" smtClean="0"/>
+              <a:rPr lang="en-US" sz="1200" dirty="0" err="1"/>
               <a:t>FileInfo</a:t>
             </a:r>
-            <a:r>
-              <a:rPr lang="en-US" sz="1200" dirty="0" smtClean="0"/>
-              <a:t/>
-            </a:r>
             <a:br>
-              <a:rPr lang="en-US" sz="1200" dirty="0" smtClean="0"/>
+              <a:rPr lang="en-US" sz="1200" dirty="0"/>
             </a:br>
             <a:r>
-              <a:rPr lang="en-US" sz="1200" dirty="0" smtClean="0"/>
+              <a:rPr lang="en-US" sz="1200" dirty="0"/>
               <a:t>Extractor</a:t>
             </a:r>
-            <a:endParaRPr lang="en-US" sz="1200" dirty="0"/>
           </a:p>
         </p:txBody>
       </p:sp>
@@ -5524,21 +5430,16 @@
           <a:p>
             <a:pPr algn="ctr"/>
             <a:r>
-              <a:rPr lang="en-US" sz="1200" dirty="0" err="1" smtClean="0"/>
+              <a:rPr lang="en-US" sz="1200" dirty="0" err="1"/>
               <a:t>FileInfo</a:t>
             </a:r>
-            <a:r>
-              <a:rPr lang="en-US" sz="1200" dirty="0" smtClean="0"/>
-              <a:t/>
-            </a:r>
             <a:br>
-              <a:rPr lang="en-US" sz="1200" dirty="0" smtClean="0"/>
+              <a:rPr lang="en-US" sz="1200" dirty="0"/>
             </a:br>
             <a:r>
-              <a:rPr lang="en-US" sz="1200" dirty="0" smtClean="0"/>
+              <a:rPr lang="en-US" sz="1200" dirty="0"/>
               <a:t>Analyzer</a:t>
             </a:r>
-            <a:endParaRPr lang="en-US" sz="1200" dirty="0"/>
           </a:p>
         </p:txBody>
       </p:sp>
@@ -5587,21 +5488,16 @@
           <a:p>
             <a:pPr algn="ctr"/>
             <a:r>
-              <a:rPr lang="en-US" sz="1200" dirty="0" err="1" smtClean="0"/>
+              <a:rPr lang="en-US" sz="1200" dirty="0" err="1"/>
               <a:t>FileResults</a:t>
             </a:r>
-            <a:r>
-              <a:rPr lang="en-US" sz="1200" dirty="0" smtClean="0"/>
-              <a:t/>
-            </a:r>
             <a:br>
-              <a:rPr lang="en-US" sz="1200" dirty="0" smtClean="0"/>
+              <a:rPr lang="en-US" sz="1200" dirty="0"/>
             </a:br>
             <a:r>
-              <a:rPr lang="en-US" sz="1200" dirty="0" smtClean="0"/>
+              <a:rPr lang="en-US" sz="1200" dirty="0"/>
               <a:t>Aggregator</a:t>
             </a:r>
-            <a:endParaRPr lang="en-US" sz="1200" dirty="0"/>
           </a:p>
         </p:txBody>
       </p:sp>
@@ -5760,10 +5656,9 @@
             <a:p>
               <a:pPr algn="ctr"/>
               <a:r>
-                <a:rPr lang="en-US" sz="1200" dirty="0" smtClean="0"/>
+                <a:rPr lang="en-US" sz="1200" dirty="0"/>
                 <a:t>File Info</a:t>
               </a:r>
-              <a:endParaRPr lang="en-US" sz="1200" dirty="0"/>
             </a:p>
           </p:txBody>
         </p:sp>
@@ -5997,10 +5892,9 @@
             <a:p>
               <a:pPr algn="ctr"/>
               <a:r>
-                <a:rPr lang="en-US" sz="1200" dirty="0" smtClean="0"/>
+                <a:rPr lang="en-US" sz="1200" dirty="0"/>
                 <a:t>File results</a:t>
               </a:r>
-              <a:endParaRPr lang="en-US" sz="1200" dirty="0"/>
             </a:p>
           </p:txBody>
         </p:sp>
@@ -6274,10 +6168,9 @@
           <a:p>
             <a:pPr algn="ctr"/>
             <a:r>
-              <a:rPr lang="en-US" sz="1400" dirty="0" smtClean="0"/>
+              <a:rPr lang="en-US" sz="1400" dirty="0"/>
               <a:t>Main</a:t>
             </a:r>
-            <a:endParaRPr lang="en-US" sz="1400" dirty="0"/>
           </a:p>
         </p:txBody>
       </p:sp>
@@ -6480,7 +6373,7 @@
           <a:p>
             <a:pPr algn="ctr"/>
             <a:r>
-              <a:rPr lang="en-US" sz="1200" dirty="0" err="1" smtClean="0"/>
+              <a:rPr lang="en-US" sz="1200" dirty="0" err="1"/>
               <a:t>CommitsReporter</a:t>
             </a:r>
             <a:endParaRPr lang="en-US" sz="1200" dirty="0"/>
@@ -6610,7 +6503,7 @@
           <a:p>
             <a:pPr algn="ctr"/>
             <a:r>
-              <a:rPr lang="en-US" sz="1200" dirty="0" err="1" smtClean="0"/>
+              <a:rPr lang="en-US" sz="1200" dirty="0" err="1"/>
               <a:t>AuthorshipReporter</a:t>
             </a:r>
             <a:endParaRPr lang="en-US" sz="1200" dirty="0"/>
@@ -6790,10 +6683,9 @@
           <a:lstStyle/>
           <a:p>
             <a:r>
-              <a:rPr lang="en-US" sz="1200" dirty="0" smtClean="0"/>
+              <a:rPr lang="en-US" sz="1200" dirty="0"/>
               <a:t>Data flow</a:t>
             </a:r>
-            <a:endParaRPr lang="en-US" sz="1200" dirty="0"/>
           </a:p>
         </p:txBody>
       </p:sp>
@@ -6842,10 +6734,9 @@
           <a:p>
             <a:pPr algn="ctr"/>
             <a:r>
-              <a:rPr lang="en-US" sz="1200" dirty="0" smtClean="0"/>
+              <a:rPr lang="en-US" sz="1200" dirty="0"/>
               <a:t>Dashboard Generator</a:t>
             </a:r>
-            <a:endParaRPr lang="en-US" sz="1200" dirty="0"/>
           </a:p>
         </p:txBody>
       </p:sp>
@@ -7004,10 +6895,9 @@
             <a:p>
               <a:pPr algn="ctr"/>
               <a:r>
-                <a:rPr lang="en-US" sz="1200" dirty="0" smtClean="0"/>
+                <a:rPr lang="en-US" sz="1200" dirty="0"/>
                 <a:t>Aggregated results </a:t>
               </a:r>
-              <a:endParaRPr lang="en-US" sz="1200" dirty="0"/>
             </a:p>
           </p:txBody>
         </p:sp>
@@ -7247,10 +7137,9 @@
           <a:p>
             <a:pPr algn="ctr"/>
             <a:r>
-              <a:rPr lang="en-US" sz="1200" dirty="0" smtClean="0"/>
+              <a:rPr lang="en-US" sz="1200" dirty="0"/>
               <a:t>Model</a:t>
             </a:r>
-            <a:endParaRPr lang="en-US" sz="1200" dirty="0"/>
           </a:p>
         </p:txBody>
       </p:sp>
@@ -7299,10 +7188,9 @@
           <a:p>
             <a:pPr algn="ctr"/>
             <a:r>
-              <a:rPr lang="en-US" sz="1200" dirty="0" smtClean="0"/>
+              <a:rPr lang="en-US" sz="1200" dirty="0"/>
               <a:t>System</a:t>
             </a:r>
-            <a:endParaRPr lang="en-US" sz="1200" dirty="0"/>
           </a:p>
         </p:txBody>
       </p:sp>

</xml_diff>